<commit_message>
fix scripturi SQL + cleanup prezentare
</commit_message>
<xml_diff>
--- a/SQL/Prezentare_Workshop/SQL Presentation.pptx
+++ b/SQL/Prezentare_Workshop/SQL Presentation.pptx
@@ -41,15 +41,15 @@
     <p:sldId id="355" r:id="rId35"/>
     <p:sldId id="336" r:id="rId36"/>
     <p:sldId id="333" r:id="rId37"/>
-    <p:sldId id="364" r:id="rId38"/>
-    <p:sldId id="363" r:id="rId39"/>
-    <p:sldId id="334" r:id="rId40"/>
-    <p:sldId id="337" r:id="rId41"/>
-    <p:sldId id="330" r:id="rId42"/>
-    <p:sldId id="356" r:id="rId43"/>
-    <p:sldId id="357" r:id="rId44"/>
+    <p:sldId id="363" r:id="rId38"/>
+    <p:sldId id="334" r:id="rId39"/>
+    <p:sldId id="337" r:id="rId40"/>
+    <p:sldId id="330" r:id="rId41"/>
+    <p:sldId id="356" r:id="rId42"/>
+    <p:sldId id="357" r:id="rId43"/>
+    <p:sldId id="380" r:id="rId44"/>
     <p:sldId id="359" r:id="rId45"/>
-    <p:sldId id="378" r:id="rId46"/>
+    <p:sldId id="381" r:id="rId46"/>
     <p:sldId id="358" r:id="rId47"/>
     <p:sldId id="338" r:id="rId48"/>
     <p:sldId id="365" r:id="rId49"/>
@@ -2890,14 +2890,22 @@
           <a:p>
             <a:r>
               <a:rPr lang="en-US" dirty="0" smtClean="0"/>
-              <a:t>					SQL</a:t>
+              <a:t>SQL</a:t>
+            </a:r>
+            <a:r>
+              <a:rPr lang="en-US" dirty="0" smtClean="0"/>
+              <a:t/>
             </a:r>
             <a:br>
               <a:rPr lang="en-US" dirty="0" smtClean="0"/>
             </a:br>
             <a:r>
               <a:rPr lang="en-US" dirty="0" smtClean="0"/>
-              <a:t>Structured Data Language</a:t>
+              <a:t>Structured </a:t>
+            </a:r>
+            <a:r>
+              <a:rPr lang="en-US" dirty="0" smtClean="0"/>
+              <a:t>Query Language</a:t>
             </a:r>
             <a:endParaRPr lang="en-US" dirty="0"/>
           </a:p>
@@ -2933,7 +2941,7 @@
                 <a:latin typeface="Arial"/>
                 <a:cs typeface="Arial"/>
               </a:rPr>
-              <a:t> Date: </a:t>
+              <a:t> </a:t>
             </a:r>
             <a:r>
               <a:rPr lang="en-US" sz="800" dirty="0" smtClean="0">
@@ -2943,7 +2951,7 @@
                 <a:latin typeface="Arial"/>
                 <a:cs typeface="Arial"/>
               </a:rPr>
-              <a:t>03</a:t>
+              <a:t>06</a:t>
             </a:r>
             <a:r>
               <a:rPr lang="de-DE" sz="800" dirty="0" smtClean="0">
@@ -2956,16 +2964,6 @@
               <a:t>.</a:t>
             </a:r>
             <a:r>
-              <a:rPr lang="ro-RO" sz="800" dirty="0" smtClean="0">
-                <a:solidFill>
-                  <a:srgbClr val="FFFFFF"/>
-                </a:solidFill>
-                <a:latin typeface="Arial"/>
-                <a:cs typeface="Arial"/>
-              </a:rPr>
-              <a:t>1</a:t>
-            </a:r>
-            <a:r>
               <a:rPr lang="en-US" sz="800" dirty="0" smtClean="0">
                 <a:solidFill>
                   <a:srgbClr val="FFFFFF"/>
@@ -2973,7 +2971,7 @@
                 <a:latin typeface="Arial"/>
                 <a:cs typeface="Arial"/>
               </a:rPr>
-              <a:t>1</a:t>
+              <a:t>07</a:t>
             </a:r>
             <a:r>
               <a:rPr lang="de-DE" sz="800" dirty="0" smtClean="0">
@@ -2983,7 +2981,27 @@
                 <a:latin typeface="Arial"/>
                 <a:cs typeface="Arial"/>
               </a:rPr>
-              <a:t>.2014													          Daniel Popa</a:t>
+              <a:t>.2016</a:t>
+            </a:r>
+            <a:r>
+              <a:rPr lang="de-DE" sz="800" dirty="0" smtClean="0">
+                <a:solidFill>
+                  <a:srgbClr val="FFFFFF"/>
+                </a:solidFill>
+                <a:latin typeface="Arial"/>
+                <a:cs typeface="Arial"/>
+              </a:rPr>
+              <a:t>													          </a:t>
+            </a:r>
+            <a:r>
+              <a:rPr lang="de-DE" sz="800" dirty="0" smtClean="0">
+                <a:solidFill>
+                  <a:srgbClr val="FFFFFF"/>
+                </a:solidFill>
+                <a:latin typeface="Arial"/>
+                <a:cs typeface="Arial"/>
+              </a:rPr>
+              <a:t>Teamnet</a:t>
             </a:r>
             <a:endParaRPr lang="ro-RO" sz="800" dirty="0" smtClean="0">
               <a:solidFill>
@@ -3566,6 +3584,39 @@
             </a:endParaRPr>
           </a:p>
           <a:p>
+            <a:pPr marL="0" marR="0" lvl="0" indent="0" algn="just" defTabSz="457200" rtl="0" eaLnBrk="1" fontAlgn="auto" latinLnBrk="0" hangingPunct="1">
+              <a:lnSpc>
+                <a:spcPct val="100000"/>
+              </a:lnSpc>
+              <a:spcBef>
+                <a:spcPct val="20000"/>
+              </a:spcBef>
+              <a:spcAft>
+                <a:spcPts val="0"/>
+              </a:spcAft>
+              <a:buClrTx/>
+              <a:buSzTx/>
+              <a:buFont typeface="Arial"/>
+              <a:buNone/>
+              <a:tabLst/>
+              <a:defRPr/>
+            </a:pPr>
+            <a:endParaRPr kumimoji="0" lang="en-US" sz="1800" b="0" i="0" u="none" strike="noStrike" kern="1200" cap="none" spc="0" normalizeH="0" baseline="0" noProof="0" dirty="0" smtClean="0">
+              <a:ln>
+                <a:noFill/>
+              </a:ln>
+              <a:solidFill>
+                <a:srgbClr val="565A5C"/>
+              </a:solidFill>
+              <a:effectLst/>
+              <a:uLnTx/>
+              <a:uFillTx/>
+              <a:latin typeface="Arial"/>
+              <a:ea typeface="+mn-ea"/>
+              <a:cs typeface="Arial"/>
+            </a:endParaRPr>
+          </a:p>
+          <a:p>
             <a:pPr marL="285750" lvl="0" indent="-285750" algn="just">
               <a:spcBef>
                 <a:spcPct val="20000"/>
@@ -3608,19 +3659,6 @@
               </a:spcBef>
             </a:pPr>
             <a:endParaRPr lang="en-US" dirty="0" smtClean="0">
-              <a:solidFill>
-                <a:srgbClr val="565A5C"/>
-              </a:solidFill>
-              <a:cs typeface="Arial"/>
-            </a:endParaRPr>
-          </a:p>
-          <a:p>
-            <a:pPr lvl="0" algn="just">
-              <a:spcBef>
-                <a:spcPct val="20000"/>
-              </a:spcBef>
-            </a:pPr>
-            <a:endParaRPr lang="en-US" dirty="0">
               <a:solidFill>
                 <a:srgbClr val="565A5C"/>
               </a:solidFill>
@@ -6615,7 +6653,15 @@
             </a:r>
             <a:r>
               <a:rPr lang="en-US" dirty="0" smtClean="0"/>
-              <a:t>keyword is used to sort the result-set by one or more columns.</a:t>
+              <a:t>keyword is used to sort the </a:t>
+            </a:r>
+            <a:r>
+              <a:rPr lang="en-US" dirty="0" smtClean="0"/>
+              <a:t>result set </a:t>
+            </a:r>
+            <a:r>
+              <a:rPr lang="en-US" dirty="0" smtClean="0"/>
+              <a:t>by one or more columns.</a:t>
             </a:r>
           </a:p>
           <a:p>
@@ -7815,6 +7861,76 @@
       </p:grpSpPr>
       <p:sp>
         <p:nvSpPr>
+          <p:cNvPr id="7" name="Text Placeholder 6"/>
+          <p:cNvSpPr>
+            <a:spLocks noGrp="1"/>
+          </p:cNvSpPr>
+          <p:nvPr>
+            <p:ph type="body" sz="half" idx="2"/>
+          </p:nvPr>
+        </p:nvSpPr>
+        <p:spPr>
+          <a:xfrm>
+            <a:off x="706582" y="1701801"/>
+            <a:ext cx="7718281" cy="3930650"/>
+          </a:xfrm>
+        </p:spPr>
+        <p:txBody>
+          <a:bodyPr>
+            <a:normAutofit/>
+          </a:bodyPr>
+          <a:lstStyle/>
+          <a:p>
+            <a:pPr marL="285750" indent="-285750">
+              <a:buFont typeface="Arial" panose="020B0604020202020204" pitchFamily="34" charset="0"/>
+              <a:buChar char="•"/>
+            </a:pPr>
+            <a:r>
+              <a:rPr lang="en-US" dirty="0" smtClean="0"/>
+              <a:t>In SQL, a view is a virtual table based on the </a:t>
+            </a:r>
+            <a:r>
+              <a:rPr lang="en-US" dirty="0" smtClean="0"/>
+              <a:t>result set </a:t>
+            </a:r>
+            <a:r>
+              <a:rPr lang="en-US" dirty="0" smtClean="0"/>
+              <a:t>of an SQL statement.</a:t>
+            </a:r>
+          </a:p>
+          <a:p>
+            <a:endParaRPr lang="en-US" dirty="0" smtClean="0"/>
+          </a:p>
+          <a:p>
+            <a:pPr marL="285750" indent="-285750">
+              <a:buFont typeface="Arial" panose="020B0604020202020204" pitchFamily="34" charset="0"/>
+              <a:buChar char="•"/>
+            </a:pPr>
+            <a:r>
+              <a:rPr lang="en-US" dirty="0" smtClean="0"/>
+              <a:t>A view contains rows and columns, just like a real table. The fields in a view are fields from one or more real tables in the database.</a:t>
+            </a:r>
+          </a:p>
+          <a:p>
+            <a:endParaRPr lang="en-US" dirty="0" smtClean="0"/>
+          </a:p>
+          <a:p>
+            <a:pPr marL="285750" indent="-285750">
+              <a:buFont typeface="Arial" panose="020B0604020202020204" pitchFamily="34" charset="0"/>
+              <a:buChar char="•"/>
+            </a:pPr>
+            <a:r>
+              <a:rPr lang="en-US" dirty="0" smtClean="0"/>
+              <a:t>You can add SQL functions, WHERE and JOIN statements to a view and present the data as if the data were coming from one single table.</a:t>
+            </a:r>
+          </a:p>
+          <a:p>
+            <a:endParaRPr lang="en-US" dirty="0"/>
+          </a:p>
+        </p:txBody>
+      </p:sp>
+      <p:sp>
+        <p:nvSpPr>
           <p:cNvPr id="3" name="Title 1"/>
           <p:cNvSpPr>
             <a:spLocks noGrp="1"/>
@@ -7841,38 +7957,6 @@
           </a:p>
         </p:txBody>
       </p:sp>
-      <p:pic>
-        <p:nvPicPr>
-          <p:cNvPr id="5" name="Picture 3"/>
-          <p:cNvPicPr>
-            <a:picLocks noChangeAspect="1" noChangeArrowheads="1"/>
-          </p:cNvPicPr>
-          <p:nvPr/>
-        </p:nvPicPr>
-        <p:blipFill>
-          <a:blip r:embed="rId2" cstate="print"/>
-          <a:srcRect/>
-          <a:stretch>
-            <a:fillRect/>
-          </a:stretch>
-        </p:blipFill>
-        <p:spPr bwMode="auto">
-          <a:xfrm>
-            <a:off x="2094807" y="2072838"/>
-            <a:ext cx="4387232" cy="3083362"/>
-          </a:xfrm>
-          <a:prstGeom prst="rect">
-            <a:avLst/>
-          </a:prstGeom>
-          <a:noFill/>
-          <a:ln w="9525">
-            <a:noFill/>
-            <a:miter lim="800000"/>
-            <a:headEnd/>
-            <a:tailEnd/>
-          </a:ln>
-        </p:spPr>
-      </p:pic>
     </p:spTree>
     <p:extLst>
       <p:ext uri="{BB962C8B-B14F-4D97-AF65-F5344CB8AC3E}">
@@ -7912,7 +7996,7 @@
       </p:grpSpPr>
       <p:sp>
         <p:nvSpPr>
-          <p:cNvPr id="7" name="Text Placeholder 6"/>
+          <p:cNvPr id="4" name="Text Placeholder 6"/>
           <p:cNvSpPr>
             <a:spLocks noGrp="1"/>
           </p:cNvSpPr>
@@ -7938,43 +8022,79 @@
             </a:pPr>
             <a:r>
               <a:rPr lang="en-US" dirty="0" smtClean="0"/>
-              <a:t>In SQL, a view is a virtual table based on the result-set of an SQL statement.</a:t>
-            </a:r>
-          </a:p>
-          <a:p>
-            <a:endParaRPr lang="en-US" dirty="0" smtClean="0"/>
+              <a:t>SQL CREATE VIEW Syntax</a:t>
+            </a:r>
+          </a:p>
+          <a:p>
+            <a:r>
+              <a:rPr lang="en-US" b="1" dirty="0" smtClean="0"/>
+              <a:t>	CREATE VIEW </a:t>
+            </a:r>
+            <a:r>
+              <a:rPr lang="en-US" b="1" dirty="0" err="1" smtClean="0"/>
+              <a:t>view_name</a:t>
+            </a:r>
+            <a:r>
+              <a:rPr lang="en-US" b="1" dirty="0" smtClean="0"/>
+              <a:t> AS </a:t>
+            </a:r>
+          </a:p>
+          <a:p>
+            <a:r>
+              <a:rPr lang="en-US" b="1" dirty="0" smtClean="0"/>
+              <a:t>	SELECT </a:t>
+            </a:r>
+            <a:r>
+              <a:rPr lang="en-US" b="1" dirty="0" err="1" smtClean="0"/>
+              <a:t>column_name</a:t>
+            </a:r>
+            <a:r>
+              <a:rPr lang="en-US" b="1" dirty="0" smtClean="0"/>
+              <a:t>(s)</a:t>
+            </a:r>
+          </a:p>
+          <a:p>
+            <a:r>
+              <a:rPr lang="en-US" b="1" dirty="0" smtClean="0"/>
+              <a:t>	FROM </a:t>
+            </a:r>
+            <a:r>
+              <a:rPr lang="en-US" b="1" dirty="0" err="1" smtClean="0"/>
+              <a:t>table_name</a:t>
+            </a:r>
+            <a:endParaRPr lang="en-US" b="1" dirty="0" smtClean="0"/>
+          </a:p>
+          <a:p>
+            <a:r>
+              <a:rPr lang="en-US" b="1" dirty="0" smtClean="0"/>
+              <a:t>	WHERE condition</a:t>
+            </a:r>
+          </a:p>
+          <a:p>
+            <a:endParaRPr lang="en-US" b="1" dirty="0" smtClean="0"/>
           </a:p>
           <a:p>
             <a:pPr marL="285750" indent="-285750">
-              <a:buFont typeface="Arial" panose="020B0604020202020204" pitchFamily="34" charset="0"/>
+              <a:buFont typeface="Arial" pitchFamily="34" charset="0"/>
               <a:buChar char="•"/>
             </a:pPr>
             <a:r>
               <a:rPr lang="en-US" dirty="0" smtClean="0"/>
-              <a:t>A view contains rows and columns, just like a real table. The fields in a view are fields from one or more real tables in the database.</a:t>
-            </a:r>
-          </a:p>
-          <a:p>
-            <a:endParaRPr lang="en-US" dirty="0" smtClean="0"/>
+              <a:t>A view always shows up-to-date data! The database engine recreates the data, using the view's SQL statement, every time a user queries a view.</a:t>
+            </a:r>
           </a:p>
           <a:p>
             <a:pPr marL="285750" indent="-285750">
-              <a:buFont typeface="Arial" panose="020B0604020202020204" pitchFamily="34" charset="0"/>
-              <a:buChar char="•"/>
-            </a:pPr>
-            <a:r>
-              <a:rPr lang="en-US" dirty="0" smtClean="0"/>
-              <a:t>You can add SQL functions, WHERE and JOIN statements to a view and present the data as if the data were coming from one single table.</a:t>
-            </a:r>
-          </a:p>
-          <a:p>
-            <a:endParaRPr lang="en-US" dirty="0"/>
+              <a:buFont typeface="Arial" pitchFamily="34" charset="0"/>
+              <a:buChar char="•"/>
+            </a:pPr>
+            <a:endParaRPr lang="en-US" sz="1800" dirty="0"/>
           </a:p>
         </p:txBody>
       </p:sp>
       <p:sp>
         <p:nvSpPr>
-          <p:cNvPr id="3" name="Title 1"/>
+          <p:cNvPr id="7" name="Title 1"/>
           <p:cNvSpPr>
             <a:spLocks noGrp="1"/>
           </p:cNvSpPr>
@@ -8001,11 +8121,6 @@
         </p:txBody>
       </p:sp>
     </p:spTree>
-    <p:extLst>
-      <p:ext uri="{BB962C8B-B14F-4D97-AF65-F5344CB8AC3E}">
-        <p14:creationId xmlns:p14="http://schemas.microsoft.com/office/powerpoint/2010/main" val="2651938358"/>
-      </p:ext>
-    </p:extLst>
   </p:cSld>
   <p:clrMapOvr>
     <a:masterClrMapping/>
@@ -8039,105 +8154,7 @@
       </p:grpSpPr>
       <p:sp>
         <p:nvSpPr>
-          <p:cNvPr id="4" name="Text Placeholder 6"/>
-          <p:cNvSpPr>
-            <a:spLocks noGrp="1"/>
-          </p:cNvSpPr>
-          <p:nvPr>
-            <p:ph type="body" sz="half" idx="2"/>
-          </p:nvPr>
-        </p:nvSpPr>
-        <p:spPr>
-          <a:xfrm>
-            <a:off x="706582" y="1701801"/>
-            <a:ext cx="7718281" cy="3930650"/>
-          </a:xfrm>
-        </p:spPr>
-        <p:txBody>
-          <a:bodyPr>
-            <a:normAutofit/>
-          </a:bodyPr>
-          <a:lstStyle/>
-          <a:p>
-            <a:pPr marL="285750" indent="-285750">
-              <a:buFont typeface="Arial" panose="020B0604020202020204" pitchFamily="34" charset="0"/>
-              <a:buChar char="•"/>
-            </a:pPr>
-            <a:r>
-              <a:rPr lang="en-US" dirty="0" smtClean="0"/>
-              <a:t>SQL CREATE VIEW Syntax</a:t>
-            </a:r>
-          </a:p>
-          <a:p>
-            <a:r>
-              <a:rPr lang="en-US" b="1" dirty="0" smtClean="0"/>
-              <a:t>	CREATE VIEW </a:t>
-            </a:r>
-            <a:r>
-              <a:rPr lang="en-US" b="1" dirty="0" err="1" smtClean="0"/>
-              <a:t>view_name</a:t>
-            </a:r>
-            <a:r>
-              <a:rPr lang="en-US" b="1" dirty="0" smtClean="0"/>
-              <a:t> AS </a:t>
-            </a:r>
-          </a:p>
-          <a:p>
-            <a:r>
-              <a:rPr lang="en-US" b="1" dirty="0" smtClean="0"/>
-              <a:t>	SELECT </a:t>
-            </a:r>
-            <a:r>
-              <a:rPr lang="en-US" b="1" dirty="0" err="1" smtClean="0"/>
-              <a:t>column_name</a:t>
-            </a:r>
-            <a:r>
-              <a:rPr lang="en-US" b="1" dirty="0" smtClean="0"/>
-              <a:t>(s)</a:t>
-            </a:r>
-          </a:p>
-          <a:p>
-            <a:r>
-              <a:rPr lang="en-US" b="1" dirty="0" smtClean="0"/>
-              <a:t>	FROM </a:t>
-            </a:r>
-            <a:r>
-              <a:rPr lang="en-US" b="1" dirty="0" err="1" smtClean="0"/>
-              <a:t>table_name</a:t>
-            </a:r>
-            <a:endParaRPr lang="en-US" b="1" dirty="0" smtClean="0"/>
-          </a:p>
-          <a:p>
-            <a:r>
-              <a:rPr lang="en-US" b="1" dirty="0" smtClean="0"/>
-              <a:t>	WHERE condition</a:t>
-            </a:r>
-          </a:p>
-          <a:p>
-            <a:endParaRPr lang="en-US" b="1" dirty="0" smtClean="0"/>
-          </a:p>
-          <a:p>
-            <a:pPr marL="285750" indent="-285750">
-              <a:buFont typeface="Arial" pitchFamily="34" charset="0"/>
-              <a:buChar char="•"/>
-            </a:pPr>
-            <a:r>
-              <a:rPr lang="en-US" dirty="0"/>
-              <a:t>A view always shows up-to-date data! The database engine recreates the data, using the view's SQL statement, every time a user queries a view.</a:t>
-            </a:r>
-          </a:p>
-          <a:p>
-            <a:pPr marL="285750" indent="-285750">
-              <a:buFont typeface="Arial" pitchFamily="34" charset="0"/>
-              <a:buChar char="•"/>
-            </a:pPr>
-            <a:endParaRPr lang="en-US" sz="1800" dirty="0"/>
-          </a:p>
-        </p:txBody>
-      </p:sp>
-      <p:sp>
-        <p:nvSpPr>
-          <p:cNvPr id="7" name="Title 1"/>
+          <p:cNvPr id="2" name="Title 1"/>
           <p:cNvSpPr>
             <a:spLocks noGrp="1"/>
           </p:cNvSpPr>
@@ -8145,25 +8162,48 @@
             <p:ph type="title"/>
           </p:nvPr>
         </p:nvSpPr>
-        <p:spPr>
-          <a:xfrm>
-            <a:off x="881744" y="766826"/>
-            <a:ext cx="1213063" cy="593092"/>
-          </a:xfrm>
-        </p:spPr>
+        <p:spPr/>
         <p:txBody>
           <a:bodyPr/>
           <a:lstStyle/>
           <a:p>
+            <a:pPr marL="285750" indent="-285750"/>
             <a:r>
               <a:rPr lang="en-US" dirty="0" smtClean="0"/>
-              <a:t>Views</a:t>
+              <a:t>					Single row &amp; group functions</a:t>
+            </a:r>
+          </a:p>
+        </p:txBody>
+      </p:sp>
+      <p:sp>
+        <p:nvSpPr>
+          <p:cNvPr id="3" name="Text Placeholder 2"/>
+          <p:cNvSpPr>
+            <a:spLocks noGrp="1"/>
+          </p:cNvSpPr>
+          <p:nvPr>
+            <p:ph type="body" idx="1"/>
+          </p:nvPr>
+        </p:nvSpPr>
+        <p:spPr/>
+        <p:txBody>
+          <a:bodyPr/>
+          <a:lstStyle/>
+          <a:p>
+            <a:r>
+              <a:rPr lang="en-US" dirty="0" smtClean="0"/>
+              <a:t>8</a:t>
             </a:r>
             <a:endParaRPr lang="en-US" dirty="0"/>
           </a:p>
         </p:txBody>
       </p:sp>
     </p:spTree>
+    <p:extLst>
+      <p:ext uri="{BB962C8B-B14F-4D97-AF65-F5344CB8AC3E}">
+        <p14:creationId xmlns:p14="http://schemas.microsoft.com/office/powerpoint/2010/main" val="1062756762"/>
+      </p:ext>
+    </p:extLst>
   </p:cSld>
   <p:clrMapOvr>
     <a:masterClrMapping/>
@@ -8197,7 +8237,7 @@
       </p:grpSpPr>
       <p:sp>
         <p:nvSpPr>
-          <p:cNvPr id="2" name="Title 1"/>
+          <p:cNvPr id="3" name="Title 1"/>
           <p:cNvSpPr>
             <a:spLocks noGrp="1"/>
           </p:cNvSpPr>
@@ -8205,46 +8245,236 @@
             <p:ph type="title"/>
           </p:nvPr>
         </p:nvSpPr>
-        <p:spPr/>
+        <p:spPr>
+          <a:xfrm>
+            <a:off x="881744" y="766826"/>
+            <a:ext cx="3706882" cy="593092"/>
+          </a:xfrm>
+        </p:spPr>
         <p:txBody>
           <a:bodyPr/>
           <a:lstStyle/>
           <a:p>
-            <a:pPr marL="285750" indent="-285750"/>
-            <a:r>
-              <a:rPr lang="en-US" dirty="0" smtClean="0"/>
-              <a:t>					Single row &amp; group functions</a:t>
-            </a:r>
+            <a:r>
+              <a:rPr lang="en-US" b="0" dirty="0" smtClean="0"/>
+              <a:t>Single row functions</a:t>
+            </a:r>
+            <a:endParaRPr lang="en-US" dirty="0"/>
           </a:p>
         </p:txBody>
       </p:sp>
+      <p:pic>
+        <p:nvPicPr>
+          <p:cNvPr id="5" name="Picture 2"/>
+          <p:cNvPicPr>
+            <a:picLocks noChangeAspect="1" noChangeArrowheads="1"/>
+          </p:cNvPicPr>
+          <p:nvPr/>
+        </p:nvPicPr>
+        <p:blipFill>
+          <a:blip r:embed="rId2" cstate="print"/>
+          <a:srcRect/>
+          <a:stretch>
+            <a:fillRect/>
+          </a:stretch>
+        </p:blipFill>
+        <p:spPr bwMode="auto">
+          <a:xfrm>
+            <a:off x="673919" y="1554480"/>
+            <a:ext cx="3753986" cy="2150225"/>
+          </a:xfrm>
+          <a:prstGeom prst="rect">
+            <a:avLst/>
+          </a:prstGeom>
+          <a:noFill/>
+          <a:ln w="9525">
+            <a:noFill/>
+            <a:miter lim="800000"/>
+            <a:headEnd/>
+            <a:tailEnd/>
+          </a:ln>
+        </p:spPr>
+      </p:pic>
       <p:sp>
         <p:nvSpPr>
-          <p:cNvPr id="3" name="Text Placeholder 2"/>
-          <p:cNvSpPr>
-            <a:spLocks noGrp="1"/>
-          </p:cNvSpPr>
-          <p:nvPr>
-            <p:ph type="body" idx="1"/>
-          </p:nvPr>
+          <p:cNvPr id="6" name="TextBox 5"/>
+          <p:cNvSpPr txBox="1"/>
+          <p:nvPr/>
         </p:nvSpPr>
-        <p:spPr/>
+        <p:spPr>
+          <a:xfrm>
+            <a:off x="4572000" y="1554480"/>
+            <a:ext cx="3733800" cy="3408625"/>
+          </a:xfrm>
+          <a:prstGeom prst="rect">
+            <a:avLst/>
+          </a:prstGeom>
+          <a:noFill/>
+        </p:spPr>
         <p:txBody>
-          <a:bodyPr/>
+          <a:bodyPr wrap="square" rtlCol="0">
+            <a:spAutoFit/>
+          </a:bodyPr>
           <a:lstStyle/>
           <a:p>
-            <a:r>
-              <a:rPr lang="en-US" dirty="0" smtClean="0"/>
-              <a:t>8</a:t>
-            </a:r>
-            <a:endParaRPr lang="en-US" dirty="0"/>
+            <a:pPr>
+              <a:spcAft>
+                <a:spcPts val="300"/>
+              </a:spcAft>
+            </a:pPr>
+            <a:r>
+              <a:rPr lang="en-US" b="1" dirty="0" smtClean="0">
+                <a:latin typeface="Arial" pitchFamily="34" charset="0"/>
+                <a:cs typeface="Arial" pitchFamily="34" charset="0"/>
+              </a:rPr>
+              <a:t>What are single row functions?</a:t>
+            </a:r>
+          </a:p>
+          <a:p>
+            <a:pPr indent="117475">
+              <a:spcAft>
+                <a:spcPts val="300"/>
+              </a:spcAft>
+            </a:pPr>
+            <a:endParaRPr lang="en-US" b="1" dirty="0" smtClean="0">
+              <a:latin typeface="Arial" pitchFamily="34" charset="0"/>
+              <a:cs typeface="Arial" pitchFamily="34" charset="0"/>
+            </a:endParaRPr>
+          </a:p>
+          <a:p>
+            <a:pPr marL="117475" indent="227013">
+              <a:spcAft>
+                <a:spcPts val="300"/>
+              </a:spcAft>
+              <a:buFont typeface="Arial" pitchFamily="34" charset="0"/>
+              <a:buChar char="•"/>
+            </a:pPr>
+            <a:r>
+              <a:rPr lang="en-US" dirty="0" smtClean="0">
+                <a:latin typeface="Arial" pitchFamily="34" charset="0"/>
+                <a:cs typeface="Arial" pitchFamily="34" charset="0"/>
+              </a:rPr>
+              <a:t>Are manipulating data</a:t>
+            </a:r>
+          </a:p>
+          <a:p>
+            <a:pPr marL="117475" indent="227013">
+              <a:spcAft>
+                <a:spcPts val="300"/>
+              </a:spcAft>
+              <a:buFont typeface="Arial" pitchFamily="34" charset="0"/>
+              <a:buChar char="•"/>
+            </a:pPr>
+            <a:r>
+              <a:rPr lang="en-US" dirty="0" smtClean="0">
+                <a:latin typeface="Arial" pitchFamily="34" charset="0"/>
+                <a:cs typeface="Arial" pitchFamily="34" charset="0"/>
+              </a:rPr>
+              <a:t>Accept arguments and return a single value</a:t>
+            </a:r>
+          </a:p>
+          <a:p>
+            <a:pPr marL="117475" indent="227013">
+              <a:spcAft>
+                <a:spcPts val="300"/>
+              </a:spcAft>
+              <a:buFont typeface="Arial" pitchFamily="34" charset="0"/>
+              <a:buChar char="•"/>
+            </a:pPr>
+            <a:r>
+              <a:rPr lang="en-US" dirty="0" smtClean="0">
+                <a:latin typeface="Arial" pitchFamily="34" charset="0"/>
+                <a:cs typeface="Arial" pitchFamily="34" charset="0"/>
+              </a:rPr>
+              <a:t>Act on each row </a:t>
+            </a:r>
+          </a:p>
+          <a:p>
+            <a:pPr marL="117475" indent="227013">
+              <a:spcAft>
+                <a:spcPts val="300"/>
+              </a:spcAft>
+              <a:buFont typeface="Arial" pitchFamily="34" charset="0"/>
+              <a:buChar char="•"/>
+            </a:pPr>
+            <a:r>
+              <a:rPr lang="en-US" dirty="0" smtClean="0">
+                <a:latin typeface="Arial" pitchFamily="34" charset="0"/>
+                <a:cs typeface="Arial" pitchFamily="34" charset="0"/>
+              </a:rPr>
+              <a:t>Retrieve a single result per each record </a:t>
+            </a:r>
+          </a:p>
+          <a:p>
+            <a:pPr marL="117475" indent="227013">
+              <a:spcAft>
+                <a:spcPts val="300"/>
+              </a:spcAft>
+              <a:buFont typeface="Arial" pitchFamily="34" charset="0"/>
+              <a:buChar char="•"/>
+            </a:pPr>
+            <a:r>
+              <a:rPr lang="en-US" dirty="0" smtClean="0">
+                <a:latin typeface="Arial" pitchFamily="34" charset="0"/>
+                <a:cs typeface="Arial" pitchFamily="34" charset="0"/>
+              </a:rPr>
+              <a:t>Can be nested</a:t>
+            </a:r>
+          </a:p>
+          <a:p>
+            <a:pPr marL="117475" indent="227013">
+              <a:spcAft>
+                <a:spcPts val="300"/>
+              </a:spcAft>
+              <a:buFont typeface="Arial" pitchFamily="34" charset="0"/>
+              <a:buChar char="•"/>
+            </a:pPr>
+            <a:r>
+              <a:rPr lang="en-US" dirty="0" smtClean="0">
+                <a:latin typeface="Arial" pitchFamily="34" charset="0"/>
+                <a:cs typeface="Arial" pitchFamily="34" charset="0"/>
+              </a:rPr>
+              <a:t>Arguments can be table columns or expressions</a:t>
+            </a:r>
           </a:p>
         </p:txBody>
       </p:sp>
+      <p:pic>
+        <p:nvPicPr>
+          <p:cNvPr id="8" name="Picture 3"/>
+          <p:cNvPicPr>
+            <a:picLocks noChangeAspect="1" noChangeArrowheads="1"/>
+          </p:cNvPicPr>
+          <p:nvPr/>
+        </p:nvPicPr>
+        <p:blipFill>
+          <a:blip r:embed="rId3" cstate="print"/>
+          <a:srcRect/>
+          <a:stretch>
+            <a:fillRect/>
+          </a:stretch>
+        </p:blipFill>
+        <p:spPr bwMode="auto">
+          <a:xfrm>
+            <a:off x="520931" y="3704706"/>
+            <a:ext cx="4051069" cy="1752600"/>
+          </a:xfrm>
+          <a:prstGeom prst="rect">
+            <a:avLst/>
+          </a:prstGeom>
+          <a:noFill/>
+          <a:ln w="9525">
+            <a:noFill/>
+            <a:miter lim="800000"/>
+            <a:headEnd/>
+            <a:tailEnd/>
+          </a:ln>
+        </p:spPr>
+      </p:pic>
     </p:spTree>
     <p:extLst>
       <p:ext uri="{BB962C8B-B14F-4D97-AF65-F5344CB8AC3E}">
-        <p14:creationId xmlns:p14="http://schemas.microsoft.com/office/powerpoint/2010/main" val="1062756762"/>
+        <p14:creationId xmlns:p14="http://schemas.microsoft.com/office/powerpoint/2010/main" val="2651938358"/>
       </p:ext>
     </p:extLst>
   </p:cSld>
@@ -8278,6 +8508,66 @@
           <a:chExt cx="0" cy="0"/>
         </a:xfrm>
       </p:grpSpPr>
+      <p:pic>
+        <p:nvPicPr>
+          <p:cNvPr id="10" name="Picture 3"/>
+          <p:cNvPicPr>
+            <a:picLocks noChangeAspect="1" noChangeArrowheads="1"/>
+          </p:cNvPicPr>
+          <p:nvPr/>
+        </p:nvPicPr>
+        <p:blipFill rotWithShape="1">
+          <a:blip r:embed="rId2" cstate="print"/>
+          <a:srcRect t="21368"/>
+          <a:stretch/>
+        </p:blipFill>
+        <p:spPr bwMode="auto">
+          <a:xfrm>
+            <a:off x="4688682" y="1901227"/>
+            <a:ext cx="3632358" cy="2148989"/>
+          </a:xfrm>
+          <a:prstGeom prst="rect">
+            <a:avLst/>
+          </a:prstGeom>
+          <a:noFill/>
+          <a:ln w="9525">
+            <a:noFill/>
+            <a:miter lim="800000"/>
+            <a:headEnd/>
+            <a:tailEnd/>
+          </a:ln>
+        </p:spPr>
+      </p:pic>
+      <p:pic>
+        <p:nvPicPr>
+          <p:cNvPr id="9" name="Picture 2"/>
+          <p:cNvPicPr>
+            <a:picLocks noChangeAspect="1" noChangeArrowheads="1"/>
+          </p:cNvPicPr>
+          <p:nvPr/>
+        </p:nvPicPr>
+        <p:blipFill rotWithShape="1">
+          <a:blip r:embed="rId3" cstate="print"/>
+          <a:srcRect t="32815"/>
+          <a:stretch/>
+        </p:blipFill>
+        <p:spPr bwMode="auto">
+          <a:xfrm>
+            <a:off x="4741936" y="4390928"/>
+            <a:ext cx="3488574" cy="1216566"/>
+          </a:xfrm>
+          <a:prstGeom prst="rect">
+            <a:avLst/>
+          </a:prstGeom>
+          <a:noFill/>
+          <a:ln w="9525">
+            <a:noFill/>
+            <a:miter lim="800000"/>
+            <a:headEnd/>
+            <a:tailEnd/>
+          </a:ln>
+        </p:spPr>
+      </p:pic>
       <p:sp>
         <p:nvSpPr>
           <p:cNvPr id="3" name="Title 1"/>
@@ -8308,14 +8598,14 @@
       </p:sp>
       <p:pic>
         <p:nvPicPr>
-          <p:cNvPr id="5" name="Picture 2"/>
+          <p:cNvPr id="7" name="Picture 4"/>
           <p:cNvPicPr>
             <a:picLocks noChangeAspect="1" noChangeArrowheads="1"/>
           </p:cNvPicPr>
           <p:nvPr/>
         </p:nvPicPr>
         <p:blipFill>
-          <a:blip r:embed="rId2" cstate="print"/>
+          <a:blip r:embed="rId4" cstate="print"/>
           <a:srcRect/>
           <a:stretch>
             <a:fillRect/>
@@ -8323,184 +8613,8 @@
         </p:blipFill>
         <p:spPr bwMode="auto">
           <a:xfrm>
-            <a:off x="673919" y="1554480"/>
-            <a:ext cx="3753986" cy="2150225"/>
-          </a:xfrm>
-          <a:prstGeom prst="rect">
-            <a:avLst/>
-          </a:prstGeom>
-          <a:noFill/>
-          <a:ln w="9525">
-            <a:noFill/>
-            <a:miter lim="800000"/>
-            <a:headEnd/>
-            <a:tailEnd/>
-          </a:ln>
-        </p:spPr>
-      </p:pic>
-      <p:sp>
-        <p:nvSpPr>
-          <p:cNvPr id="6" name="TextBox 5"/>
-          <p:cNvSpPr txBox="1"/>
-          <p:nvPr/>
-        </p:nvSpPr>
-        <p:spPr>
-          <a:xfrm>
-            <a:off x="4572000" y="1554480"/>
-            <a:ext cx="3733800" cy="3408625"/>
-          </a:xfrm>
-          <a:prstGeom prst="rect">
-            <a:avLst/>
-          </a:prstGeom>
-          <a:noFill/>
-        </p:spPr>
-        <p:txBody>
-          <a:bodyPr wrap="square" rtlCol="0">
-            <a:spAutoFit/>
-          </a:bodyPr>
-          <a:lstStyle/>
-          <a:p>
-            <a:pPr>
-              <a:spcAft>
-                <a:spcPts val="300"/>
-              </a:spcAft>
-            </a:pPr>
-            <a:r>
-              <a:rPr lang="en-US" b="1" dirty="0" smtClean="0">
-                <a:latin typeface="Arial" pitchFamily="34" charset="0"/>
-                <a:cs typeface="Arial" pitchFamily="34" charset="0"/>
-              </a:rPr>
-              <a:t>What are single row functions?</a:t>
-            </a:r>
-          </a:p>
-          <a:p>
-            <a:pPr indent="117475">
-              <a:spcAft>
-                <a:spcPts val="300"/>
-              </a:spcAft>
-            </a:pPr>
-            <a:endParaRPr lang="en-US" b="1" dirty="0" smtClean="0">
-              <a:latin typeface="Arial" pitchFamily="34" charset="0"/>
-              <a:cs typeface="Arial" pitchFamily="34" charset="0"/>
-            </a:endParaRPr>
-          </a:p>
-          <a:p>
-            <a:pPr marL="117475" indent="227013">
-              <a:spcAft>
-                <a:spcPts val="300"/>
-              </a:spcAft>
-              <a:buFont typeface="Arial" pitchFamily="34" charset="0"/>
-              <a:buChar char="•"/>
-            </a:pPr>
-            <a:r>
-              <a:rPr lang="en-US" dirty="0" smtClean="0">
-                <a:latin typeface="Arial" pitchFamily="34" charset="0"/>
-                <a:cs typeface="Arial" pitchFamily="34" charset="0"/>
-              </a:rPr>
-              <a:t>Are manipulating data</a:t>
-            </a:r>
-          </a:p>
-          <a:p>
-            <a:pPr marL="117475" indent="227013">
-              <a:spcAft>
-                <a:spcPts val="300"/>
-              </a:spcAft>
-              <a:buFont typeface="Arial" pitchFamily="34" charset="0"/>
-              <a:buChar char="•"/>
-            </a:pPr>
-            <a:r>
-              <a:rPr lang="en-US" dirty="0" smtClean="0">
-                <a:latin typeface="Arial" pitchFamily="34" charset="0"/>
-                <a:cs typeface="Arial" pitchFamily="34" charset="0"/>
-              </a:rPr>
-              <a:t>Accept arguments and return a single value</a:t>
-            </a:r>
-          </a:p>
-          <a:p>
-            <a:pPr marL="117475" indent="227013">
-              <a:spcAft>
-                <a:spcPts val="300"/>
-              </a:spcAft>
-              <a:buFont typeface="Arial" pitchFamily="34" charset="0"/>
-              <a:buChar char="•"/>
-            </a:pPr>
-            <a:r>
-              <a:rPr lang="en-US" dirty="0" smtClean="0">
-                <a:latin typeface="Arial" pitchFamily="34" charset="0"/>
-                <a:cs typeface="Arial" pitchFamily="34" charset="0"/>
-              </a:rPr>
-              <a:t>Act on each row </a:t>
-            </a:r>
-          </a:p>
-          <a:p>
-            <a:pPr marL="117475" indent="227013">
-              <a:spcAft>
-                <a:spcPts val="300"/>
-              </a:spcAft>
-              <a:buFont typeface="Arial" pitchFamily="34" charset="0"/>
-              <a:buChar char="•"/>
-            </a:pPr>
-            <a:r>
-              <a:rPr lang="en-US" dirty="0" smtClean="0">
-                <a:latin typeface="Arial" pitchFamily="34" charset="0"/>
-                <a:cs typeface="Arial" pitchFamily="34" charset="0"/>
-              </a:rPr>
-              <a:t>Retrieve a single result per each record </a:t>
-            </a:r>
-          </a:p>
-          <a:p>
-            <a:pPr marL="117475" indent="227013">
-              <a:spcAft>
-                <a:spcPts val="300"/>
-              </a:spcAft>
-              <a:buFont typeface="Arial" pitchFamily="34" charset="0"/>
-              <a:buChar char="•"/>
-            </a:pPr>
-            <a:r>
-              <a:rPr lang="en-US" dirty="0" smtClean="0">
-                <a:latin typeface="Arial" pitchFamily="34" charset="0"/>
-                <a:cs typeface="Arial" pitchFamily="34" charset="0"/>
-              </a:rPr>
-              <a:t>Can be nested</a:t>
-            </a:r>
-          </a:p>
-          <a:p>
-            <a:pPr marL="117475" indent="227013">
-              <a:spcAft>
-                <a:spcPts val="300"/>
-              </a:spcAft>
-              <a:buFont typeface="Arial" pitchFamily="34" charset="0"/>
-              <a:buChar char="•"/>
-            </a:pPr>
-            <a:r>
-              <a:rPr lang="en-US" dirty="0" smtClean="0">
-                <a:latin typeface="Arial" pitchFamily="34" charset="0"/>
-                <a:cs typeface="Arial" pitchFamily="34" charset="0"/>
-              </a:rPr>
-              <a:t>Arguments can be table columns or expressions</a:t>
-            </a:r>
-          </a:p>
-        </p:txBody>
-      </p:sp>
-      <p:pic>
-        <p:nvPicPr>
-          <p:cNvPr id="8" name="Picture 3"/>
-          <p:cNvPicPr>
-            <a:picLocks noChangeAspect="1" noChangeArrowheads="1"/>
-          </p:cNvPicPr>
-          <p:nvPr/>
-        </p:nvPicPr>
-        <p:blipFill>
-          <a:blip r:embed="rId3" cstate="print"/>
-          <a:srcRect/>
-          <a:stretch>
-            <a:fillRect/>
-          </a:stretch>
-        </p:blipFill>
-        <p:spPr bwMode="auto">
-          <a:xfrm>
-            <a:off x="520931" y="3704706"/>
-            <a:ext cx="4051069" cy="1752600"/>
+            <a:off x="454429" y="2186334"/>
+            <a:ext cx="3624567" cy="2590800"/>
           </a:xfrm>
           <a:prstGeom prst="rect">
             <a:avLst/>
@@ -8581,7 +8695,7 @@
       </p:sp>
       <p:pic>
         <p:nvPicPr>
-          <p:cNvPr id="7" name="Picture 4"/>
+          <p:cNvPr id="9" name="Picture 4"/>
           <p:cNvPicPr>
             <a:picLocks noChangeAspect="1" noChangeArrowheads="1"/>
           </p:cNvPicPr>
@@ -8596,72 +8710,8 @@
         </p:blipFill>
         <p:spPr bwMode="auto">
           <a:xfrm>
-            <a:off x="454429" y="2186334"/>
-            <a:ext cx="3624567" cy="2590800"/>
-          </a:xfrm>
-          <a:prstGeom prst="rect">
-            <a:avLst/>
-          </a:prstGeom>
-          <a:noFill/>
-          <a:ln w="9525">
-            <a:noFill/>
-            <a:miter lim="800000"/>
-            <a:headEnd/>
-            <a:tailEnd/>
-          </a:ln>
-        </p:spPr>
-      </p:pic>
-      <p:pic>
-        <p:nvPicPr>
-          <p:cNvPr id="9" name="Picture 2"/>
-          <p:cNvPicPr>
-            <a:picLocks noChangeAspect="1" noChangeArrowheads="1"/>
-          </p:cNvPicPr>
-          <p:nvPr/>
-        </p:nvPicPr>
-        <p:blipFill>
-          <a:blip r:embed="rId3" cstate="print"/>
-          <a:srcRect/>
-          <a:stretch>
-            <a:fillRect/>
-          </a:stretch>
-        </p:blipFill>
-        <p:spPr bwMode="auto">
-          <a:xfrm>
-            <a:off x="4832466" y="4095490"/>
-            <a:ext cx="3488574" cy="1810767"/>
-          </a:xfrm>
-          <a:prstGeom prst="rect">
-            <a:avLst/>
-          </a:prstGeom>
-          <a:noFill/>
-          <a:ln w="9525">
-            <a:noFill/>
-            <a:miter lim="800000"/>
-            <a:headEnd/>
-            <a:tailEnd/>
-          </a:ln>
-        </p:spPr>
-      </p:pic>
-      <p:pic>
-        <p:nvPicPr>
-          <p:cNvPr id="10" name="Picture 3"/>
-          <p:cNvPicPr>
-            <a:picLocks noChangeAspect="1" noChangeArrowheads="1"/>
-          </p:cNvPicPr>
-          <p:nvPr/>
-        </p:nvPicPr>
-        <p:blipFill>
-          <a:blip r:embed="rId4" cstate="print"/>
-          <a:srcRect/>
-          <a:stretch>
-            <a:fillRect/>
-          </a:stretch>
-        </p:blipFill>
-        <p:spPr bwMode="auto">
-          <a:xfrm>
-            <a:off x="4688682" y="1362522"/>
-            <a:ext cx="3632358" cy="2732968"/>
+            <a:off x="1306484" y="1875458"/>
+            <a:ext cx="6393416" cy="3275964"/>
           </a:xfrm>
           <a:prstGeom prst="rect">
             <a:avLst/>
@@ -8859,30 +8909,6 @@
           </a:p>
         </p:txBody>
       </p:sp>
-      <p:pic>
-        <p:nvPicPr>
-          <p:cNvPr id="4" name="Picture 3" descr="database.jpg"/>
-          <p:cNvPicPr>
-            <a:picLocks noChangeAspect="1"/>
-          </p:cNvPicPr>
-          <p:nvPr/>
-        </p:nvPicPr>
-        <p:blipFill>
-          <a:blip r:embed="rId2"/>
-          <a:stretch>
-            <a:fillRect/>
-          </a:stretch>
-        </p:blipFill>
-        <p:spPr>
-          <a:xfrm>
-            <a:off x="5606848" y="1925183"/>
-            <a:ext cx="2922009" cy="1753205"/>
-          </a:xfrm>
-          <a:prstGeom prst="rect">
-            <a:avLst/>
-          </a:prstGeom>
-        </p:spPr>
-      </p:pic>
     </p:spTree>
     <p:extLst>
       <p:ext uri="{BB962C8B-B14F-4D97-AF65-F5344CB8AC3E}">
@@ -8957,17 +8983,15 @@
           </p:cNvPicPr>
           <p:nvPr/>
         </p:nvPicPr>
-        <p:blipFill>
+        <p:blipFill rotWithShape="1">
           <a:blip r:embed="rId2" cstate="print"/>
-          <a:srcRect/>
-          <a:stretch>
-            <a:fillRect/>
-          </a:stretch>
+          <a:srcRect t="50688" r="24618"/>
+          <a:stretch/>
         </p:blipFill>
         <p:spPr bwMode="auto">
           <a:xfrm>
-            <a:off x="4140221" y="3268286"/>
-            <a:ext cx="3306597" cy="2044931"/>
+            <a:off x="4414498" y="3929203"/>
+            <a:ext cx="4050489" cy="1638675"/>
           </a:xfrm>
           <a:prstGeom prst="rect">
             <a:avLst/>
@@ -8983,23 +9007,21 @@
       </p:pic>
       <p:pic>
         <p:nvPicPr>
-          <p:cNvPr id="9" name="Picture 4"/>
+          <p:cNvPr id="5" name="Picture 3"/>
           <p:cNvPicPr>
             <a:picLocks noChangeAspect="1" noChangeArrowheads="1"/>
           </p:cNvPicPr>
           <p:nvPr/>
         </p:nvPicPr>
-        <p:blipFill>
-          <a:blip r:embed="rId3" cstate="print"/>
-          <a:srcRect/>
-          <a:stretch>
-            <a:fillRect/>
-          </a:stretch>
+        <p:blipFill rotWithShape="1">
+          <a:blip r:embed="rId2" cstate="print"/>
+          <a:srcRect t="10685" b="49266"/>
+          <a:stretch/>
         </p:blipFill>
         <p:spPr bwMode="auto">
           <a:xfrm>
-            <a:off x="4140221" y="1621796"/>
-            <a:ext cx="2718262" cy="1392828"/>
+            <a:off x="573287" y="2154718"/>
+            <a:ext cx="5373334" cy="1330861"/>
           </a:xfrm>
           <a:prstGeom prst="rect">
             <a:avLst/>
@@ -9015,23 +9037,21 @@
       </p:pic>
       <p:pic>
         <p:nvPicPr>
-          <p:cNvPr id="10" name="Picture 5"/>
+          <p:cNvPr id="6" name="Picture 3"/>
           <p:cNvPicPr>
             <a:picLocks noChangeAspect="1" noChangeArrowheads="1"/>
           </p:cNvPicPr>
           <p:nvPr/>
         </p:nvPicPr>
-        <p:blipFill>
-          <a:blip r:embed="rId4" cstate="print"/>
-          <a:srcRect/>
-          <a:stretch>
-            <a:fillRect/>
-          </a:stretch>
+        <p:blipFill rotWithShape="1">
+          <a:blip r:embed="rId2" cstate="print"/>
+          <a:srcRect b="89361"/>
+          <a:stretch/>
         </p:blipFill>
         <p:spPr bwMode="auto">
           <a:xfrm>
-            <a:off x="1180408" y="3575865"/>
-            <a:ext cx="1842308" cy="1380800"/>
+            <a:off x="1901959" y="1592944"/>
+            <a:ext cx="5373334" cy="353549"/>
           </a:xfrm>
           <a:prstGeom prst="rect">
             <a:avLst/>
@@ -9045,42 +9065,10 @@
           </a:ln>
         </p:spPr>
       </p:pic>
-      <p:pic>
-        <p:nvPicPr>
-          <p:cNvPr id="11" name="Picture 7"/>
-          <p:cNvPicPr>
-            <a:picLocks noChangeAspect="1" noChangeArrowheads="1"/>
-          </p:cNvPicPr>
-          <p:nvPr/>
-        </p:nvPicPr>
-        <p:blipFill>
-          <a:blip r:embed="rId5" cstate="print"/>
-          <a:srcRect/>
-          <a:stretch>
-            <a:fillRect/>
-          </a:stretch>
-        </p:blipFill>
-        <p:spPr bwMode="auto">
-          <a:xfrm>
-            <a:off x="1180408" y="1621796"/>
-            <a:ext cx="1637082" cy="1471352"/>
-          </a:xfrm>
-          <a:prstGeom prst="rect">
-            <a:avLst/>
-          </a:prstGeom>
-          <a:noFill/>
-          <a:ln w="9525">
-            <a:noFill/>
-            <a:miter lim="800000"/>
-            <a:headEnd/>
-            <a:tailEnd/>
-          </a:ln>
-        </p:spPr>
-      </p:pic>
     </p:spTree>
     <p:extLst>
       <p:ext uri="{BB962C8B-B14F-4D97-AF65-F5344CB8AC3E}">
-        <p14:creationId xmlns:p14="http://schemas.microsoft.com/office/powerpoint/2010/main" val="2651938358"/>
+        <p14:creationId xmlns:p14="http://schemas.microsoft.com/office/powerpoint/2010/main" val="2082651842"/>
       </p:ext>
     </p:extLst>
   </p:cSld>
@@ -9353,7 +9341,7 @@
       </p:grpSpPr>
       <p:sp>
         <p:nvSpPr>
-          <p:cNvPr id="2" name="Title 1"/>
+          <p:cNvPr id="3" name="Title 1"/>
           <p:cNvSpPr>
             <a:spLocks noGrp="1"/>
           </p:cNvSpPr>
@@ -9363,8 +9351,8 @@
         </p:nvSpPr>
         <p:spPr>
           <a:xfrm>
-            <a:off x="881743" y="766826"/>
-            <a:ext cx="5610497" cy="593092"/>
+            <a:off x="881744" y="766826"/>
+            <a:ext cx="3706882" cy="593092"/>
           </a:xfrm>
         </p:spPr>
         <p:txBody>
@@ -9372,7 +9360,7 @@
           <a:lstStyle/>
           <a:p>
             <a:r>
-              <a:rPr lang="en-US" b="0" dirty="0" smtClean="0"/>
+              <a:rPr lang="en-US" b="0" dirty="0"/>
               <a:t>GROUP BY Clause</a:t>
             </a:r>
             <a:endParaRPr lang="en-US" dirty="0"/>
@@ -9381,13 +9369,13 @@
       </p:sp>
       <p:sp>
         <p:nvSpPr>
-          <p:cNvPr id="4" name="Rectangle 3"/>
+          <p:cNvPr id="8" name="Rectangle 7"/>
           <p:cNvSpPr/>
           <p:nvPr/>
         </p:nvSpPr>
         <p:spPr>
           <a:xfrm>
-            <a:off x="714895" y="2144684"/>
+            <a:off x="714895" y="1882134"/>
             <a:ext cx="7805650" cy="3970318"/>
           </a:xfrm>
           <a:prstGeom prst="rect">
@@ -9414,8 +9402,13 @@
             </a:r>
             <a:r>
               <a:rPr lang="en-US" dirty="0" smtClean="0"/>
-              <a:t> clause is used to do operations on groups of rows</a:t>
-            </a:r>
+              <a:t> clause is used to do operations on groups of </a:t>
+            </a:r>
+            <a:r>
+              <a:rPr lang="en-US" dirty="0" smtClean="0"/>
+              <a:t>rows.</a:t>
+            </a:r>
+            <a:endParaRPr lang="en-US" dirty="0" smtClean="0"/>
           </a:p>
           <a:p>
             <a:pPr marL="285750" indent="-285750">
@@ -9513,8 +9506,13 @@
             </a:pPr>
             <a:r>
               <a:rPr lang="en-US" dirty="0" smtClean="0"/>
-              <a:t>SQL will partition the query based on the columns in the GROUP BY clause and operate the group function on the rest of the selected columns</a:t>
-            </a:r>
+              <a:t>SQL will partition the query based on the columns in the GROUP BY clause and operate the group function on the rest of the selected </a:t>
+            </a:r>
+            <a:r>
+              <a:rPr lang="en-US" dirty="0" smtClean="0"/>
+              <a:t>columns.</a:t>
+            </a:r>
+            <a:endParaRPr lang="en-US" dirty="0" smtClean="0"/>
           </a:p>
           <a:p>
             <a:pPr marL="285750" indent="-285750">
@@ -9528,7 +9526,7 @@
     </p:spTree>
     <p:extLst>
       <p:ext uri="{BB962C8B-B14F-4D97-AF65-F5344CB8AC3E}">
-        <p14:creationId xmlns:p14="http://schemas.microsoft.com/office/powerpoint/2010/main" val="1875229047"/>
+        <p14:creationId xmlns:p14="http://schemas.microsoft.com/office/powerpoint/2010/main" val="2596643926"/>
       </p:ext>
     </p:extLst>
   </p:cSld>
@@ -10757,108 +10755,67 @@
           </a:bodyPr>
           <a:lstStyle/>
           <a:p>
+            <a:pPr marL="342900" indent="-342900">
+              <a:spcAft>
+                <a:spcPts val="300"/>
+              </a:spcAft>
+              <a:buFont typeface="Arial" panose="020B0604020202020204" pitchFamily="34" charset="0"/>
+              <a:buChar char="•"/>
+            </a:pPr>
+            <a:r>
+              <a:rPr lang="en-US" sz="2000" b="1" dirty="0" smtClean="0">
+                <a:latin typeface="Arial" pitchFamily="34" charset="0"/>
+                <a:cs typeface="Arial" pitchFamily="34" charset="0"/>
+              </a:rPr>
+              <a:t>What is a relational </a:t>
+            </a:r>
+            <a:r>
+              <a:rPr lang="en-US" sz="2000" b="1" dirty="0" smtClean="0">
+                <a:latin typeface="Arial" pitchFamily="34" charset="0"/>
+                <a:cs typeface="Arial" pitchFamily="34" charset="0"/>
+              </a:rPr>
+              <a:t>database?</a:t>
+            </a:r>
+          </a:p>
+          <a:p>
             <a:pPr>
               <a:spcAft>
                 <a:spcPts val="300"/>
               </a:spcAft>
             </a:pPr>
-            <a:r>
-              <a:rPr lang="en-US" sz="2000" b="1" dirty="0" smtClean="0">
-                <a:latin typeface="Arial" pitchFamily="34" charset="0"/>
-                <a:cs typeface="Arial" pitchFamily="34" charset="0"/>
-              </a:rPr>
-              <a:t>What is a relational model?</a:t>
-            </a:r>
-          </a:p>
-          <a:p>
-            <a:pPr>
+            <a:endParaRPr lang="en-US" sz="2000" b="1" dirty="0" smtClean="0">
+              <a:latin typeface="Arial" pitchFamily="34" charset="0"/>
+              <a:cs typeface="Arial" pitchFamily="34" charset="0"/>
+            </a:endParaRPr>
+          </a:p>
+          <a:p>
+            <a:pPr marL="342900" indent="-342900">
               <a:spcAft>
                 <a:spcPts val="300"/>
               </a:spcAft>
+              <a:buFont typeface="Arial" panose="020B0604020202020204" pitchFamily="34" charset="0"/>
+              <a:buChar char="•"/>
             </a:pPr>
             <a:r>
               <a:rPr lang="en-US" sz="2000" dirty="0" smtClean="0">
                 <a:latin typeface="Arial" pitchFamily="34" charset="0"/>
                 <a:cs typeface="Arial" pitchFamily="34" charset="0"/>
               </a:rPr>
-              <a:t>RDBMS – </a:t>
-            </a:r>
-            <a:r>
-              <a:rPr lang="en-US" sz="2000" b="1" dirty="0" smtClean="0">
-                <a:latin typeface="Arial" pitchFamily="34" charset="0"/>
-                <a:cs typeface="Arial" pitchFamily="34" charset="0"/>
-              </a:rPr>
-              <a:t>R</a:t>
+              <a:t>RDBMS – Relational </a:t>
             </a:r>
             <a:r>
               <a:rPr lang="en-US" sz="2000" dirty="0" smtClean="0">
                 <a:latin typeface="Arial" pitchFamily="34" charset="0"/>
                 <a:cs typeface="Arial" pitchFamily="34" charset="0"/>
               </a:rPr>
-              <a:t>elational </a:t>
-            </a:r>
-            <a:r>
-              <a:rPr lang="en-US" sz="2000" b="1" dirty="0" err="1" smtClean="0">
-                <a:latin typeface="Arial" pitchFamily="34" charset="0"/>
-                <a:cs typeface="Arial" pitchFamily="34" charset="0"/>
-              </a:rPr>
-              <a:t>D</a:t>
-            </a:r>
-            <a:r>
-              <a:rPr lang="en-US" sz="2000" dirty="0" err="1" smtClean="0">
-                <a:latin typeface="Arial" pitchFamily="34" charset="0"/>
-                <a:cs typeface="Arial" pitchFamily="34" charset="0"/>
-              </a:rPr>
-              <a:t>ata</a:t>
-            </a:r>
-            <a:r>
-              <a:rPr lang="en-US" sz="2000" b="1" dirty="0" err="1" smtClean="0">
-                <a:latin typeface="Arial" pitchFamily="34" charset="0"/>
-                <a:cs typeface="Arial" pitchFamily="34" charset="0"/>
-              </a:rPr>
-              <a:t>B</a:t>
-            </a:r>
-            <a:r>
-              <a:rPr lang="en-US" sz="2000" dirty="0" err="1" smtClean="0">
-                <a:latin typeface="Arial" pitchFamily="34" charset="0"/>
-                <a:cs typeface="Arial" pitchFamily="34" charset="0"/>
-              </a:rPr>
-              <a:t>ase</a:t>
+              <a:t>Database </a:t>
             </a:r>
             <a:r>
               <a:rPr lang="en-US" sz="2000" dirty="0" smtClean="0">
                 <a:latin typeface="Arial" pitchFamily="34" charset="0"/>
                 <a:cs typeface="Arial" pitchFamily="34" charset="0"/>
               </a:rPr>
-              <a:t> </a:t>
-            </a:r>
-            <a:r>
-              <a:rPr lang="en-US" sz="2000" b="1" dirty="0" smtClean="0">
-                <a:latin typeface="Arial" pitchFamily="34" charset="0"/>
-                <a:cs typeface="Arial" pitchFamily="34" charset="0"/>
-              </a:rPr>
-              <a:t>M</a:t>
-            </a:r>
-            <a:r>
-              <a:rPr lang="en-US" sz="2000" dirty="0" smtClean="0">
-                <a:latin typeface="Arial" pitchFamily="34" charset="0"/>
-                <a:cs typeface="Arial" pitchFamily="34" charset="0"/>
-              </a:rPr>
-              <a:t>anagement </a:t>
-            </a:r>
-            <a:r>
-              <a:rPr lang="en-US" sz="2000" b="1" dirty="0" smtClean="0">
-                <a:latin typeface="Arial" pitchFamily="34" charset="0"/>
-                <a:cs typeface="Arial" pitchFamily="34" charset="0"/>
-              </a:rPr>
-              <a:t>S</a:t>
-            </a:r>
-            <a:r>
-              <a:rPr lang="en-US" sz="2000" dirty="0" smtClean="0">
-                <a:latin typeface="Arial" pitchFamily="34" charset="0"/>
-                <a:cs typeface="Arial" pitchFamily="34" charset="0"/>
-              </a:rPr>
-              <a:t>ystem</a:t>
+              <a:t>Management System</a:t>
             </a:r>
           </a:p>
           <a:p>
@@ -10906,7 +10863,14 @@
                 <a:latin typeface="Arial" pitchFamily="34" charset="0"/>
                 <a:cs typeface="Arial" pitchFamily="34" charset="0"/>
               </a:rPr>
-              <a:t>Assures  data integrity for accuracy and consistency</a:t>
+              <a:t>Ensures data </a:t>
+            </a:r>
+            <a:r>
+              <a:rPr lang="en-US" dirty="0" smtClean="0">
+                <a:latin typeface="Arial" pitchFamily="34" charset="0"/>
+                <a:cs typeface="Arial" pitchFamily="34" charset="0"/>
+              </a:rPr>
+              <a:t>integrity for accuracy and consistency</a:t>
             </a:r>
             <a:endParaRPr lang="en-US" dirty="0"/>
           </a:p>
@@ -11750,21 +11714,14 @@
                 <a:latin typeface="Arial" pitchFamily="34" charset="0"/>
                 <a:cs typeface="Arial" pitchFamily="34" charset="0"/>
               </a:rPr>
-              <a:t>(</a:t>
-            </a:r>
-            <a:r>
-              <a:rPr lang="en-US" sz="2000" dirty="0" err="1" smtClean="0">
-                <a:latin typeface="Arial" pitchFamily="34" charset="0"/>
-                <a:cs typeface="Arial" pitchFamily="34" charset="0"/>
-              </a:rPr>
-              <a:t>eXpress</a:t>
+              <a:t>(Express </a:t>
             </a:r>
             <a:r>
               <a:rPr lang="en-US" sz="2000" dirty="0" smtClean="0">
                 <a:latin typeface="Arial" pitchFamily="34" charset="0"/>
                 <a:cs typeface="Arial" pitchFamily="34" charset="0"/>
               </a:rPr>
-              <a:t> Edition).</a:t>
+              <a:t>Edition).</a:t>
             </a:r>
           </a:p>
           <a:p>
@@ -11873,10 +11830,6 @@
               </a:rPr>
               <a:t>. We will create our own user, grant him permissions and work only with our user afterwards.</a:t>
             </a:r>
-            <a:endParaRPr lang="en-US" sz="2000" dirty="0" smtClean="0">
-              <a:latin typeface="Arial" pitchFamily="34" charset="0"/>
-              <a:cs typeface="Arial" pitchFamily="34" charset="0"/>
-            </a:endParaRPr>
           </a:p>
           <a:p>
             <a:pPr marL="342900" indent="-342900">
@@ -11982,183 +11935,6 @@
       </p:grpSpPr>
       <p:sp>
         <p:nvSpPr>
-          <p:cNvPr id="7" name="Text Placeholder 6"/>
-          <p:cNvSpPr>
-            <a:spLocks noGrp="1"/>
-          </p:cNvSpPr>
-          <p:nvPr>
-            <p:ph type="body" sz="half" idx="2"/>
-          </p:nvPr>
-        </p:nvSpPr>
-        <p:spPr>
-          <a:xfrm>
-            <a:off x="706582" y="1701801"/>
-            <a:ext cx="7718281" cy="3930650"/>
-          </a:xfrm>
-        </p:spPr>
-        <p:txBody>
-          <a:bodyPr>
-            <a:normAutofit/>
-          </a:bodyPr>
-          <a:lstStyle/>
-          <a:p>
-            <a:pPr>
-              <a:spcAft>
-                <a:spcPts val="300"/>
-              </a:spcAft>
-            </a:pPr>
-            <a:r>
-              <a:rPr lang="en-US" sz="2000" b="1" dirty="0" smtClean="0">
-                <a:latin typeface="Arial" pitchFamily="34" charset="0"/>
-                <a:cs typeface="Arial" pitchFamily="34" charset="0"/>
-              </a:rPr>
-              <a:t>What is a relational model?</a:t>
-            </a:r>
-          </a:p>
-          <a:p>
-            <a:pPr>
-              <a:spcAft>
-                <a:spcPts val="300"/>
-              </a:spcAft>
-            </a:pPr>
-            <a:r>
-              <a:rPr lang="en-US" sz="2000" dirty="0" smtClean="0">
-                <a:latin typeface="Arial" pitchFamily="34" charset="0"/>
-                <a:cs typeface="Arial" pitchFamily="34" charset="0"/>
-              </a:rPr>
-              <a:t>RDBMS – </a:t>
-            </a:r>
-            <a:r>
-              <a:rPr lang="en-US" sz="2000" b="1" dirty="0" smtClean="0">
-                <a:latin typeface="Arial" pitchFamily="34" charset="0"/>
-                <a:cs typeface="Arial" pitchFamily="34" charset="0"/>
-              </a:rPr>
-              <a:t>R</a:t>
-            </a:r>
-            <a:r>
-              <a:rPr lang="en-US" sz="2000" dirty="0" smtClean="0">
-                <a:latin typeface="Arial" pitchFamily="34" charset="0"/>
-                <a:cs typeface="Arial" pitchFamily="34" charset="0"/>
-              </a:rPr>
-              <a:t>elational </a:t>
-            </a:r>
-            <a:r>
-              <a:rPr lang="en-US" sz="2000" b="1" dirty="0" err="1" smtClean="0">
-                <a:latin typeface="Arial" pitchFamily="34" charset="0"/>
-                <a:cs typeface="Arial" pitchFamily="34" charset="0"/>
-              </a:rPr>
-              <a:t>D</a:t>
-            </a:r>
-            <a:r>
-              <a:rPr lang="en-US" sz="2000" dirty="0" err="1" smtClean="0">
-                <a:latin typeface="Arial" pitchFamily="34" charset="0"/>
-                <a:cs typeface="Arial" pitchFamily="34" charset="0"/>
-              </a:rPr>
-              <a:t>ata</a:t>
-            </a:r>
-            <a:r>
-              <a:rPr lang="en-US" sz="2000" b="1" dirty="0" err="1" smtClean="0">
-                <a:latin typeface="Arial" pitchFamily="34" charset="0"/>
-                <a:cs typeface="Arial" pitchFamily="34" charset="0"/>
-              </a:rPr>
-              <a:t>B</a:t>
-            </a:r>
-            <a:r>
-              <a:rPr lang="en-US" sz="2000" dirty="0" err="1" smtClean="0">
-                <a:latin typeface="Arial" pitchFamily="34" charset="0"/>
-                <a:cs typeface="Arial" pitchFamily="34" charset="0"/>
-              </a:rPr>
-              <a:t>ase</a:t>
-            </a:r>
-            <a:r>
-              <a:rPr lang="en-US" sz="2000" dirty="0" smtClean="0">
-                <a:latin typeface="Arial" pitchFamily="34" charset="0"/>
-                <a:cs typeface="Arial" pitchFamily="34" charset="0"/>
-              </a:rPr>
-              <a:t> </a:t>
-            </a:r>
-            <a:r>
-              <a:rPr lang="en-US" sz="2000" b="1" dirty="0" smtClean="0">
-                <a:latin typeface="Arial" pitchFamily="34" charset="0"/>
-                <a:cs typeface="Arial" pitchFamily="34" charset="0"/>
-              </a:rPr>
-              <a:t>M</a:t>
-            </a:r>
-            <a:r>
-              <a:rPr lang="en-US" sz="2000" dirty="0" smtClean="0">
-                <a:latin typeface="Arial" pitchFamily="34" charset="0"/>
-                <a:cs typeface="Arial" pitchFamily="34" charset="0"/>
-              </a:rPr>
-              <a:t>anagement </a:t>
-            </a:r>
-            <a:r>
-              <a:rPr lang="en-US" sz="2000" b="1" dirty="0" smtClean="0">
-                <a:latin typeface="Arial" pitchFamily="34" charset="0"/>
-                <a:cs typeface="Arial" pitchFamily="34" charset="0"/>
-              </a:rPr>
-              <a:t>S</a:t>
-            </a:r>
-            <a:r>
-              <a:rPr lang="en-US" sz="2000" dirty="0" smtClean="0">
-                <a:latin typeface="Arial" pitchFamily="34" charset="0"/>
-                <a:cs typeface="Arial" pitchFamily="34" charset="0"/>
-              </a:rPr>
-              <a:t>ystem</a:t>
-            </a:r>
-          </a:p>
-          <a:p>
-            <a:pPr marL="227013" lvl="0" indent="342900">
-              <a:spcAft>
-                <a:spcPts val="300"/>
-              </a:spcAft>
-              <a:buFont typeface="+mj-lt"/>
-              <a:buAutoNum type="arabicPeriod"/>
-            </a:pPr>
-            <a:r>
-              <a:rPr lang="en-US" dirty="0" smtClean="0">
-                <a:latin typeface="Arial" pitchFamily="34" charset="0"/>
-                <a:cs typeface="Arial" pitchFamily="34" charset="0"/>
-              </a:rPr>
-              <a:t>A collection of objects and relations that stores data. In our case this is represented by tables, organized in rows and columns.</a:t>
-            </a:r>
-          </a:p>
-          <a:p>
-            <a:pPr marL="227013" lvl="0" indent="342900">
-              <a:spcAft>
-                <a:spcPts val="300"/>
-              </a:spcAft>
-              <a:buFont typeface="+mj-lt"/>
-              <a:buAutoNum type="arabicPeriod"/>
-            </a:pPr>
-            <a:r>
-              <a:rPr lang="en-US" dirty="0" smtClean="0">
-                <a:latin typeface="Arial" pitchFamily="34" charset="0"/>
-                <a:cs typeface="Arial" pitchFamily="34" charset="0"/>
-              </a:rPr>
-              <a:t>A set of operations that acts on the relations to create other relations</a:t>
-            </a:r>
-          </a:p>
-          <a:p>
-            <a:pPr marL="227013" lvl="0" indent="342900">
-              <a:spcAft>
-                <a:spcPts val="300"/>
-              </a:spcAft>
-              <a:buFont typeface="+mj-lt"/>
-              <a:buAutoNum type="arabicPeriod"/>
-            </a:pPr>
-            <a:r>
-              <a:rPr lang="en-US" dirty="0" smtClean="0">
-                <a:latin typeface="Arial" pitchFamily="34" charset="0"/>
-                <a:cs typeface="Arial" pitchFamily="34" charset="0"/>
-              </a:rPr>
-              <a:t>Assures  data integrity for accuracy and consistency</a:t>
-            </a:r>
-            <a:endParaRPr lang="en-US" dirty="0"/>
-          </a:p>
-        </p:txBody>
-      </p:sp>
-      <p:sp>
-        <p:nvSpPr>
           <p:cNvPr id="3" name="Title 1"/>
           <p:cNvSpPr>
             <a:spLocks noGrp="1"/>
@@ -12187,34 +11963,26 @@
       </p:sp>
       <p:pic>
         <p:nvPicPr>
-          <p:cNvPr id="1026" name="Picture 2"/>
+          <p:cNvPr id="5" name="Picture 4"/>
           <p:cNvPicPr>
-            <a:picLocks noChangeAspect="1" noChangeArrowheads="1"/>
+            <a:picLocks noChangeAspect="1"/>
           </p:cNvPicPr>
           <p:nvPr/>
         </p:nvPicPr>
         <p:blipFill>
           <a:blip r:embed="rId2"/>
-          <a:srcRect/>
           <a:stretch>
             <a:fillRect/>
           </a:stretch>
         </p:blipFill>
-        <p:spPr bwMode="auto">
-          <a:xfrm>
-            <a:off x="254000" y="1701801"/>
-            <a:ext cx="8890000" cy="3930650"/>
+        <p:spPr>
+          <a:xfrm>
+            <a:off x="679009" y="1562774"/>
+            <a:ext cx="7146201" cy="4115446"/>
           </a:xfrm>
           <a:prstGeom prst="rect">
             <a:avLst/>
           </a:prstGeom>
-          <a:noFill/>
-          <a:ln w="9525">
-            <a:noFill/>
-            <a:miter lim="800000"/>
-            <a:headEnd/>
-            <a:tailEnd/>
-          </a:ln>
         </p:spPr>
       </p:pic>
     </p:spTree>
@@ -12379,7 +12147,15 @@
             </a:pPr>
             <a:r>
               <a:rPr lang="en-US" dirty="0" smtClean="0"/>
-              <a:t>What is a Data Definition Language?</a:t>
+              <a:t>What is </a:t>
+            </a:r>
+            <a:r>
+              <a:rPr lang="en-US" dirty="0" smtClean="0"/>
+              <a:t>Data </a:t>
+            </a:r>
+            <a:r>
+              <a:rPr lang="en-US" dirty="0" smtClean="0"/>
+              <a:t>Definition Language?</a:t>
             </a:r>
           </a:p>
           <a:p>
@@ -12419,7 +12195,15 @@
             </a:r>
             <a:r>
               <a:rPr lang="en-US" dirty="0" smtClean="0"/>
-              <a:t> description </a:t>
+              <a:t> </a:t>
+            </a:r>
+            <a:r>
+              <a:rPr lang="en-US" b="1" dirty="0" smtClean="0"/>
+              <a:t>description</a:t>
+            </a:r>
+            <a:r>
+              <a:rPr lang="en-US" dirty="0" smtClean="0"/>
+              <a:t> </a:t>
             </a:r>
             <a:r>
               <a:rPr lang="en-US" b="1" dirty="0" smtClean="0"/>
@@ -13140,6 +12924,15 @@
 </file>
 
 <file path=customXml/item1.xml><?xml version="1.0" encoding="utf-8"?>
+<p:properties xmlns:p="http://schemas.microsoft.com/office/2006/metadata/properties" xmlns:xsi="http://www.w3.org/2001/XMLSchema-instance" xmlns:pc="http://schemas.microsoft.com/office/infopath/2007/PartnerControls">
+  <documentManagement>
+    <PublishingExpirationDate xmlns="http://schemas.microsoft.com/sharepoint/v3" xsi:nil="true"/>
+    <PublishingStartDate xmlns="http://schemas.microsoft.com/sharepoint/v3" xsi:nil="true"/>
+  </documentManagement>
+</p:properties>
+</file>
+
+<file path=customXml/item2.xml><?xml version="1.0" encoding="utf-8"?>
 <ct:contentTypeSchema xmlns:ct="http://schemas.microsoft.com/office/2006/metadata/contentType" xmlns:ma="http://schemas.microsoft.com/office/2006/metadata/properties/metaAttributes" ct:_="" ma:_="" ma:contentTypeName="Document" ma:contentTypeID="0x0101002EAB9993CCBF73478E12853278F3FB5C" ma:contentTypeVersion="1" ma:contentTypeDescription="Create a new document." ma:contentTypeScope="" ma:versionID="4db10d317033d09fed4d0297d17c663a">
   <xsd:schema xmlns:xsd="http://www.w3.org/2001/XMLSchema" xmlns:xs="http://www.w3.org/2001/XMLSchema" xmlns:p="http://schemas.microsoft.com/office/2006/metadata/properties" xmlns:ns1="http://schemas.microsoft.com/sharepoint/v3" targetNamespace="http://schemas.microsoft.com/office/2006/metadata/properties" ma:root="true" ma:fieldsID="48c5b5cd9b8d25ff6dd15848836f4270" ns1:_="">
     <xsd:import namespace="http://schemas.microsoft.com/sharepoint/v3"/>
@@ -13271,15 +13064,6 @@
 </ct:contentTypeSchema>
 </file>
 
-<file path=customXml/item2.xml><?xml version="1.0" encoding="utf-8"?>
-<p:properties xmlns:p="http://schemas.microsoft.com/office/2006/metadata/properties" xmlns:xsi="http://www.w3.org/2001/XMLSchema-instance" xmlns:pc="http://schemas.microsoft.com/office/infopath/2007/PartnerControls">
-  <documentManagement>
-    <PublishingExpirationDate xmlns="http://schemas.microsoft.com/sharepoint/v3" xsi:nil="true"/>
-    <PublishingStartDate xmlns="http://schemas.microsoft.com/sharepoint/v3" xsi:nil="true"/>
-  </documentManagement>
-</p:properties>
-</file>
-
 <file path=customXml/item3.xml><?xml version="1.0" encoding="utf-8"?>
 <?mso-contentType ?>
 <FormTemplates xmlns="http://schemas.microsoft.com/sharepoint/v3/contenttype/forms">
@@ -13290,6 +13074,16 @@
 </file>
 
 <file path=customXml/itemProps1.xml><?xml version="1.0" encoding="utf-8"?>
+<ds:datastoreItem xmlns:ds="http://schemas.openxmlformats.org/officeDocument/2006/customXml" ds:itemID="{C1424CC9-255C-4972-B5F2-6F19B32F3DEA}">
+  <ds:schemaRefs>
+    <ds:schemaRef ds:uri="http://schemas.microsoft.com/office/2006/metadata/properties"/>
+    <ds:schemaRef ds:uri="http://schemas.microsoft.com/office/infopath/2007/PartnerControls"/>
+    <ds:schemaRef ds:uri="http://schemas.microsoft.com/sharepoint/v3"/>
+  </ds:schemaRefs>
+</ds:datastoreItem>
+</file>
+
+<file path=customXml/itemProps2.xml><?xml version="1.0" encoding="utf-8"?>
 <ds:datastoreItem xmlns:ds="http://schemas.openxmlformats.org/officeDocument/2006/customXml" ds:itemID="{E29AC310-E4D3-4181-8DC8-8BCBD631C9E0}">
   <ds:schemaRefs>
     <ds:schemaRef ds:uri="http://schemas.microsoft.com/office/2006/metadata/contentType"/>
@@ -13307,16 +13101,6 @@
 </ds:datastoreItem>
 </file>
 
-<file path=customXml/itemProps2.xml><?xml version="1.0" encoding="utf-8"?>
-<ds:datastoreItem xmlns:ds="http://schemas.openxmlformats.org/officeDocument/2006/customXml" ds:itemID="{C1424CC9-255C-4972-B5F2-6F19B32F3DEA}">
-  <ds:schemaRefs>
-    <ds:schemaRef ds:uri="http://schemas.microsoft.com/office/2006/metadata/properties"/>
-    <ds:schemaRef ds:uri="http://schemas.microsoft.com/office/infopath/2007/PartnerControls"/>
-    <ds:schemaRef ds:uri="http://schemas.microsoft.com/sharepoint/v3"/>
-  </ds:schemaRefs>
-</ds:datastoreItem>
-</file>
-
 <file path=customXml/itemProps3.xml><?xml version="1.0" encoding="utf-8"?>
 <ds:datastoreItem xmlns:ds="http://schemas.openxmlformats.org/officeDocument/2006/customXml" ds:itemID="{B3E8851E-A513-4DE1-BFEA-60B7444A3522}">
   <ds:schemaRefs>

</xml_diff>